<commit_message>
Dataflow diagram now matches AdaptMisc/Architecture/
</commit_message>
<xml_diff>
--- a/Ingest/dataflow.pptx
+++ b/Ingest/dataflow.pptx
@@ -288,7 +288,7 @@
           <a:p>
             <a:fld id="{CFE7CCCB-4BA6-B04E-9D16-520C9E59725C}" type="datetimeFigureOut">
               <a:rPr lang="en-US" smtClean="0"/>
-              <a:t>3/11/16</a:t>
+              <a:t>27-Apr-2016</a:t>
             </a:fld>
             <a:endParaRPr lang="en-US"/>
           </a:p>
@@ -458,7 +458,7 @@
           <a:p>
             <a:fld id="{CFE7CCCB-4BA6-B04E-9D16-520C9E59725C}" type="datetimeFigureOut">
               <a:rPr lang="en-US" smtClean="0"/>
-              <a:t>3/11/16</a:t>
+              <a:t>27-Apr-2016</a:t>
             </a:fld>
             <a:endParaRPr lang="en-US"/>
           </a:p>
@@ -638,7 +638,7 @@
           <a:p>
             <a:fld id="{CFE7CCCB-4BA6-B04E-9D16-520C9E59725C}" type="datetimeFigureOut">
               <a:rPr lang="en-US" smtClean="0"/>
-              <a:t>3/11/16</a:t>
+              <a:t>27-Apr-2016</a:t>
             </a:fld>
             <a:endParaRPr lang="en-US"/>
           </a:p>
@@ -808,7 +808,7 @@
           <a:p>
             <a:fld id="{CFE7CCCB-4BA6-B04E-9D16-520C9E59725C}" type="datetimeFigureOut">
               <a:rPr lang="en-US" smtClean="0"/>
-              <a:t>3/11/16</a:t>
+              <a:t>27-Apr-2016</a:t>
             </a:fld>
             <a:endParaRPr lang="en-US"/>
           </a:p>
@@ -1054,7 +1054,7 @@
           <a:p>
             <a:fld id="{CFE7CCCB-4BA6-B04E-9D16-520C9E59725C}" type="datetimeFigureOut">
               <a:rPr lang="en-US" smtClean="0"/>
-              <a:t>3/11/16</a:t>
+              <a:t>27-Apr-2016</a:t>
             </a:fld>
             <a:endParaRPr lang="en-US"/>
           </a:p>
@@ -1342,7 +1342,7 @@
           <a:p>
             <a:fld id="{CFE7CCCB-4BA6-B04E-9D16-520C9E59725C}" type="datetimeFigureOut">
               <a:rPr lang="en-US" smtClean="0"/>
-              <a:t>3/11/16</a:t>
+              <a:t>27-Apr-2016</a:t>
             </a:fld>
             <a:endParaRPr lang="en-US"/>
           </a:p>
@@ -1764,7 +1764,7 @@
           <a:p>
             <a:fld id="{CFE7CCCB-4BA6-B04E-9D16-520C9E59725C}" type="datetimeFigureOut">
               <a:rPr lang="en-US" smtClean="0"/>
-              <a:t>3/11/16</a:t>
+              <a:t>27-Apr-2016</a:t>
             </a:fld>
             <a:endParaRPr lang="en-US"/>
           </a:p>
@@ -1882,7 +1882,7 @@
           <a:p>
             <a:fld id="{CFE7CCCB-4BA6-B04E-9D16-520C9E59725C}" type="datetimeFigureOut">
               <a:rPr lang="en-US" smtClean="0"/>
-              <a:t>3/11/16</a:t>
+              <a:t>27-Apr-2016</a:t>
             </a:fld>
             <a:endParaRPr lang="en-US"/>
           </a:p>
@@ -1977,7 +1977,7 @@
           <a:p>
             <a:fld id="{CFE7CCCB-4BA6-B04E-9D16-520C9E59725C}" type="datetimeFigureOut">
               <a:rPr lang="en-US" smtClean="0"/>
-              <a:t>3/11/16</a:t>
+              <a:t>27-Apr-2016</a:t>
             </a:fld>
             <a:endParaRPr lang="en-US"/>
           </a:p>
@@ -2254,7 +2254,7 @@
           <a:p>
             <a:fld id="{CFE7CCCB-4BA6-B04E-9D16-520C9E59725C}" type="datetimeFigureOut">
               <a:rPr lang="en-US" smtClean="0"/>
-              <a:t>3/11/16</a:t>
+              <a:t>27-Apr-2016</a:t>
             </a:fld>
             <a:endParaRPr lang="en-US"/>
           </a:p>
@@ -2507,7 +2507,7 @@
           <a:p>
             <a:fld id="{CFE7CCCB-4BA6-B04E-9D16-520C9E59725C}" type="datetimeFigureOut">
               <a:rPr lang="en-US" smtClean="0"/>
-              <a:t>3/11/16</a:t>
+              <a:t>27-Apr-2016</a:t>
             </a:fld>
             <a:endParaRPr lang="en-US"/>
           </a:p>
@@ -2720,7 +2720,7 @@
           <a:p>
             <a:fld id="{CFE7CCCB-4BA6-B04E-9D16-520C9E59725C}" type="datetimeFigureOut">
               <a:rPr lang="en-US" smtClean="0"/>
-              <a:t>3/11/16</a:t>
+              <a:t>27-Apr-2016</a:t>
             </a:fld>
             <a:endParaRPr lang="en-US"/>
           </a:p>
@@ -3226,23 +3226,7 @@
                   <a:srgbClr val="000000"/>
                 </a:solidFill>
               </a:rPr>
-              <a:t>(</a:t>
-            </a:r>
-            <a:r>
-              <a:rPr lang="en-US" dirty="0" err="1" smtClean="0">
-                <a:solidFill>
-                  <a:srgbClr val="000000"/>
-                </a:solidFill>
-              </a:rPr>
-              <a:t>Px</a:t>
-            </a:r>
-            <a:r>
-              <a:rPr lang="en-US" dirty="0" smtClean="0">
-                <a:solidFill>
-                  <a:srgbClr val="000000"/>
-                </a:solidFill>
-              </a:rPr>
-              <a:t>)</a:t>
+              <a:t>(Px)</a:t>
             </a:r>
             <a:endParaRPr lang="en-US" dirty="0">
               <a:solidFill>
@@ -3287,18 +3271,13 @@
           <a:p>
             <a:pPr algn="ctr"/>
             <a:r>
-              <a:rPr lang="en-US" dirty="0" err="1" smtClean="0">
+              <a:rPr lang="en-US" dirty="0" smtClean="0">
                 <a:solidFill>
                   <a:srgbClr val="000000"/>
                 </a:solidFill>
               </a:rPr>
               <a:t>Segmenter</a:t>
             </a:r>
-            <a:endParaRPr lang="en-US" dirty="0" smtClean="0">
-              <a:solidFill>
-                <a:srgbClr val="000000"/>
-              </a:solidFill>
-            </a:endParaRPr>
           </a:p>
           <a:p>
             <a:pPr algn="ctr"/>
@@ -3353,38 +3332,38 @@
           <a:p>
             <a:pPr algn="ctr"/>
             <a:r>
-              <a:rPr lang="en-US" dirty="0" smtClean="0">
+              <a:rPr lang="en-US" dirty="0">
                 <a:solidFill>
                   <a:srgbClr val="000000"/>
                 </a:solidFill>
               </a:rPr>
-              <a:t>Anomaly</a:t>
+              <a:t>Activity</a:t>
             </a:r>
             <a:br>
-              <a:rPr lang="en-US" dirty="0" smtClean="0">
+              <a:rPr lang="en-US" dirty="0">
                 <a:solidFill>
                   <a:srgbClr val="000000"/>
                 </a:solidFill>
               </a:rPr>
             </a:br>
             <a:r>
-              <a:rPr lang="en-US" dirty="0" smtClean="0">
+              <a:rPr lang="en-US" dirty="0">
                 <a:solidFill>
                   <a:srgbClr val="000000"/>
                 </a:solidFill>
               </a:rPr>
-              <a:t>Detector</a:t>
+              <a:t>Classifier</a:t>
             </a:r>
           </a:p>
           <a:p>
             <a:pPr algn="ctr"/>
             <a:r>
-              <a:rPr lang="en-US" dirty="0" smtClean="0">
+              <a:rPr lang="en-US" dirty="0">
                 <a:solidFill>
                   <a:srgbClr val="000000"/>
                 </a:solidFill>
               </a:rPr>
-              <a:t>(Ad)</a:t>
+              <a:t>(Ac)</a:t>
             </a:r>
             <a:endParaRPr lang="en-US" dirty="0">
               <a:solidFill>
@@ -3429,38 +3408,46 @@
           <a:p>
             <a:pPr algn="ctr"/>
             <a:r>
-              <a:rPr lang="en-US" dirty="0" smtClean="0">
+              <a:rPr lang="en-US" dirty="0">
                 <a:solidFill>
                   <a:srgbClr val="000000"/>
                 </a:solidFill>
               </a:rPr>
-              <a:t>Activity</a:t>
+              <a:t>Anomaly</a:t>
             </a:r>
             <a:br>
-              <a:rPr lang="en-US" dirty="0" smtClean="0">
+              <a:rPr lang="en-US" dirty="0">
                 <a:solidFill>
                   <a:srgbClr val="000000"/>
                 </a:solidFill>
               </a:rPr>
             </a:br>
             <a:r>
+              <a:rPr lang="en-US" dirty="0">
+                <a:solidFill>
+                  <a:srgbClr val="000000"/>
+                </a:solidFill>
+              </a:rPr>
+              <a:t>Detector</a:t>
+            </a:r>
+          </a:p>
+          <a:p>
+            <a:pPr algn="ctr"/>
+            <a:r>
+              <a:rPr lang="en-US" dirty="0">
+                <a:solidFill>
+                  <a:srgbClr val="000000"/>
+                </a:solidFill>
+              </a:rPr>
+              <a:t>(Ad</a:t>
+            </a:r>
+            <a:r>
               <a:rPr lang="en-US" dirty="0" smtClean="0">
                 <a:solidFill>
                   <a:srgbClr val="000000"/>
                 </a:solidFill>
               </a:rPr>
-              <a:t>Classifier</a:t>
-            </a:r>
-          </a:p>
-          <a:p>
-            <a:pPr algn="ctr"/>
-            <a:r>
-              <a:rPr lang="en-US" dirty="0" smtClean="0">
-                <a:solidFill>
-                  <a:srgbClr val="000000"/>
-                </a:solidFill>
-              </a:rPr>
-              <a:t>(Ac)</a:t>
+              <a:t>)</a:t>
             </a:r>
             <a:endParaRPr lang="en-US" dirty="0">
               <a:solidFill>
@@ -3532,23 +3519,7 @@
                   <a:srgbClr val="000000"/>
                 </a:solidFill>
               </a:rPr>
-              <a:t>(</a:t>
-            </a:r>
-            <a:r>
-              <a:rPr lang="en-US" dirty="0" err="1" smtClean="0">
-                <a:solidFill>
-                  <a:srgbClr val="000000"/>
-                </a:solidFill>
-              </a:rPr>
-              <a:t>Dx</a:t>
-            </a:r>
-            <a:r>
-              <a:rPr lang="en-US" dirty="0" smtClean="0">
-                <a:solidFill>
-                  <a:srgbClr val="000000"/>
-                </a:solidFill>
-              </a:rPr>
-              <a:t>)</a:t>
+              <a:t>(Dx)</a:t>
             </a:r>
             <a:endParaRPr lang="en-US" dirty="0">
               <a:solidFill>
@@ -3852,6 +3823,39 @@
           <a:xfrm flipV="1">
             <a:off x="6598927" y="3195320"/>
             <a:ext cx="617226" cy="831632"/>
+          </a:xfrm>
+          <a:prstGeom prst="straightConnector1">
+            <a:avLst/>
+          </a:prstGeom>
+          <a:ln>
+            <a:tailEnd type="arrow"/>
+          </a:ln>
+        </p:spPr>
+        <p:style>
+          <a:lnRef idx="2">
+            <a:schemeClr val="accent1"/>
+          </a:lnRef>
+          <a:fillRef idx="0">
+            <a:schemeClr val="accent1"/>
+          </a:fillRef>
+          <a:effectRef idx="1">
+            <a:schemeClr val="accent1"/>
+          </a:effectRef>
+          <a:fontRef idx="minor">
+            <a:schemeClr val="tx1"/>
+          </a:fontRef>
+        </p:style>
+      </p:cxnSp>
+      <p:cxnSp>
+        <p:nvCxnSpPr>
+          <p:cNvPr id="17" name="Straight Arrow Connector 16"/>
+          <p:cNvCxnSpPr/>
+          <p:nvPr/>
+        </p:nvCxnSpPr>
+        <p:spPr>
+          <a:xfrm>
+            <a:off x="4840233" y="2910597"/>
+            <a:ext cx="482725" cy="572795"/>
           </a:xfrm>
           <a:prstGeom prst="straightConnector1">
             <a:avLst/>

</xml_diff>